<commit_message>
Pulled data from remote, refined the classifier
</commit_message>
<xml_diff>
--- a/Text AlbumentationFinal.pptx
+++ b/Text AlbumentationFinal.pptx
@@ -5,10 +5,10 @@
     <p:sldMasterId id="2147483648" r:id="rId4"/>
   </p:sldMasterIdLst>
   <p:notesMasterIdLst>
-    <p:notesMasterId r:id="rId27"/>
+    <p:notesMasterId r:id="rId28"/>
   </p:notesMasterIdLst>
   <p:handoutMasterIdLst>
-    <p:handoutMasterId r:id="rId28"/>
+    <p:handoutMasterId r:id="rId29"/>
   </p:handoutMasterIdLst>
   <p:sldIdLst>
     <p:sldId id="2448" r:id="rId5"/>
@@ -29,10 +29,11 @@
     <p:sldId id="2477" r:id="rId20"/>
     <p:sldId id="2478" r:id="rId21"/>
     <p:sldId id="2479" r:id="rId22"/>
-    <p:sldId id="2474" r:id="rId23"/>
-    <p:sldId id="2475" r:id="rId24"/>
-    <p:sldId id="2480" r:id="rId25"/>
-    <p:sldId id="2436" r:id="rId26"/>
+    <p:sldId id="2481" r:id="rId23"/>
+    <p:sldId id="2474" r:id="rId24"/>
+    <p:sldId id="2475" r:id="rId25"/>
+    <p:sldId id="2480" r:id="rId26"/>
+    <p:sldId id="2436" r:id="rId27"/>
   </p:sldIdLst>
   <p:sldSz cx="12192000" cy="6858000"/>
   <p:notesSz cx="6858000" cy="9144000"/>
@@ -262,7 +263,7 @@
           <a:p>
             <a:fld id="{966D5B4E-BF3E-3B45-A4BA-D6C3B92870D7}" type="datetimeFigureOut">
               <a:rPr lang="en-US" smtClean="0"/>
-              <a:t>10/31/2022</a:t>
+              <a:t>11/6/2022</a:t>
             </a:fld>
             <a:endParaRPr lang="en-US"/>
           </a:p>
@@ -439,7 +440,7 @@
           <a:p>
             <a:fld id="{F5A8621B-8C8E-49BA-8772-41D0FE75A082}" type="datetimeFigureOut">
               <a:rPr lang="en-US" smtClean="0"/>
-              <a:t>10/31/2022</a:t>
+              <a:t>11/6/2022</a:t>
             </a:fld>
             <a:endParaRPr lang="en-US"/>
           </a:p>
@@ -11622,6 +11623,834 @@
       </p:grpSpPr>
       <p:sp>
         <p:nvSpPr>
+          <p:cNvPr id="6" name="Slide Number Placeholder 5">
+            <a:extLst>
+              <a:ext uri="{FF2B5EF4-FFF2-40B4-BE49-F238E27FC236}">
+                <a16:creationId xmlns:a16="http://schemas.microsoft.com/office/drawing/2014/main" id="{FC6A5C12-E784-444E-B868-DE2AE85742BB}"/>
+              </a:ext>
+            </a:extLst>
+          </p:cNvPr>
+          <p:cNvSpPr>
+            <a:spLocks noGrp="1"/>
+          </p:cNvSpPr>
+          <p:nvPr>
+            <p:ph type="sldNum" sz="quarter" idx="12"/>
+          </p:nvPr>
+        </p:nvSpPr>
+        <p:spPr/>
+        <p:txBody>
+          <a:bodyPr/>
+          <a:lstStyle/>
+          <a:p>
+            <a:fld id="{8C2E478F-E849-4A8C-AF1F-CBCC78A7CBFA}" type="slidenum">
+              <a:rPr lang="en-US" smtClean="0"/>
+              <a:t>19</a:t>
+            </a:fld>
+            <a:endParaRPr lang="en-US"/>
+          </a:p>
+        </p:txBody>
+      </p:sp>
+      <p:sp>
+        <p:nvSpPr>
+          <p:cNvPr id="9" name="Text Placeholder 5">
+            <a:extLst>
+              <a:ext uri="{FF2B5EF4-FFF2-40B4-BE49-F238E27FC236}">
+                <a16:creationId xmlns:a16="http://schemas.microsoft.com/office/drawing/2014/main" id="{069D2693-7CB2-FB7F-B07B-6D4429C929D5}"/>
+              </a:ext>
+            </a:extLst>
+          </p:cNvPr>
+          <p:cNvSpPr txBox="1">
+            <a:spLocks/>
+          </p:cNvSpPr>
+          <p:nvPr/>
+        </p:nvSpPr>
+        <p:spPr>
+          <a:xfrm>
+            <a:off x="5780348" y="1492004"/>
+            <a:ext cx="5997069" cy="5149707"/>
+          </a:xfrm>
+          <a:prstGeom prst="rect">
+            <a:avLst/>
+          </a:prstGeom>
+        </p:spPr>
+        <p:txBody>
+          <a:bodyPr vert="horz" lIns="91440" tIns="45720" rIns="91440" bIns="45720" rtlCol="0" anchor="t">
+            <a:noAutofit/>
+          </a:bodyPr>
+          <a:lstStyle>
+            <a:lvl1pPr marL="228600" indent="-228600" algn="l" defTabSz="914400" rtl="0" eaLnBrk="1" latinLnBrk="0" hangingPunct="1">
+              <a:lnSpc>
+                <a:spcPct val="150000"/>
+              </a:lnSpc>
+              <a:spcBef>
+                <a:spcPts val="1000"/>
+              </a:spcBef>
+              <a:buFont typeface="Arial" panose="020B0604020202020204" pitchFamily="34" charset="0"/>
+              <a:buChar char="•"/>
+              <a:defRPr sz="1600" kern="1200">
+                <a:solidFill>
+                  <a:schemeClr val="tx1"/>
+                </a:solidFill>
+                <a:latin typeface="+mn-lt"/>
+                <a:ea typeface="+mn-ea"/>
+                <a:cs typeface="+mn-cs"/>
+              </a:defRPr>
+            </a:lvl1pPr>
+            <a:lvl2pPr marL="685800" indent="-228600" algn="l" defTabSz="914400" rtl="0" eaLnBrk="1" latinLnBrk="0" hangingPunct="1">
+              <a:lnSpc>
+                <a:spcPct val="150000"/>
+              </a:lnSpc>
+              <a:spcBef>
+                <a:spcPts val="500"/>
+              </a:spcBef>
+              <a:buFont typeface="Arial" panose="020B0604020202020204" pitchFamily="34" charset="0"/>
+              <a:buChar char="•"/>
+              <a:defRPr sz="1400" kern="1200">
+                <a:solidFill>
+                  <a:schemeClr val="tx1"/>
+                </a:solidFill>
+                <a:latin typeface="+mn-lt"/>
+                <a:ea typeface="+mn-ea"/>
+                <a:cs typeface="+mn-cs"/>
+              </a:defRPr>
+            </a:lvl2pPr>
+            <a:lvl3pPr marL="1143000" indent="-228600" algn="l" defTabSz="914400" rtl="0" eaLnBrk="1" latinLnBrk="0" hangingPunct="1">
+              <a:lnSpc>
+                <a:spcPct val="150000"/>
+              </a:lnSpc>
+              <a:spcBef>
+                <a:spcPts val="500"/>
+              </a:spcBef>
+              <a:buFont typeface="Arial" panose="020B0604020202020204" pitchFamily="34" charset="0"/>
+              <a:buChar char="•"/>
+              <a:defRPr sz="1400" kern="1200">
+                <a:solidFill>
+                  <a:schemeClr val="tx1"/>
+                </a:solidFill>
+                <a:latin typeface="+mn-lt"/>
+                <a:ea typeface="+mn-ea"/>
+                <a:cs typeface="+mn-cs"/>
+              </a:defRPr>
+            </a:lvl3pPr>
+            <a:lvl4pPr marL="1600200" indent="-228600" algn="l" defTabSz="914400" rtl="0" eaLnBrk="1" latinLnBrk="0" hangingPunct="1">
+              <a:lnSpc>
+                <a:spcPct val="150000"/>
+              </a:lnSpc>
+              <a:spcBef>
+                <a:spcPts val="500"/>
+              </a:spcBef>
+              <a:buFont typeface="Arial" panose="020B0604020202020204" pitchFamily="34" charset="0"/>
+              <a:buChar char="•"/>
+              <a:defRPr sz="1200" kern="1200">
+                <a:solidFill>
+                  <a:schemeClr val="tx1"/>
+                </a:solidFill>
+                <a:latin typeface="+mn-lt"/>
+                <a:ea typeface="+mn-ea"/>
+                <a:cs typeface="+mn-cs"/>
+              </a:defRPr>
+            </a:lvl4pPr>
+            <a:lvl5pPr marL="2057400" indent="-228600" algn="l" defTabSz="914400" rtl="0" eaLnBrk="1" latinLnBrk="0" hangingPunct="1">
+              <a:lnSpc>
+                <a:spcPct val="150000"/>
+              </a:lnSpc>
+              <a:spcBef>
+                <a:spcPts val="500"/>
+              </a:spcBef>
+              <a:buFont typeface="Arial" panose="020B0604020202020204" pitchFamily="34" charset="0"/>
+              <a:buChar char="•"/>
+              <a:defRPr sz="1200" kern="1200">
+                <a:solidFill>
+                  <a:schemeClr val="tx1"/>
+                </a:solidFill>
+                <a:latin typeface="+mn-lt"/>
+                <a:ea typeface="+mn-ea"/>
+                <a:cs typeface="+mn-cs"/>
+              </a:defRPr>
+            </a:lvl5pPr>
+            <a:lvl6pPr marL="2514600" indent="-228600" algn="l" defTabSz="914400" rtl="0" eaLnBrk="1" latinLnBrk="0" hangingPunct="1">
+              <a:lnSpc>
+                <a:spcPct val="90000"/>
+              </a:lnSpc>
+              <a:spcBef>
+                <a:spcPts val="500"/>
+              </a:spcBef>
+              <a:buFont typeface="Arial" panose="020B0604020202020204" pitchFamily="34" charset="0"/>
+              <a:buChar char="•"/>
+              <a:defRPr sz="1800" kern="1200">
+                <a:solidFill>
+                  <a:schemeClr val="tx1"/>
+                </a:solidFill>
+                <a:latin typeface="+mn-lt"/>
+                <a:ea typeface="+mn-ea"/>
+                <a:cs typeface="+mn-cs"/>
+              </a:defRPr>
+            </a:lvl6pPr>
+            <a:lvl7pPr marL="2971800" indent="-228600" algn="l" defTabSz="914400" rtl="0" eaLnBrk="1" latinLnBrk="0" hangingPunct="1">
+              <a:lnSpc>
+                <a:spcPct val="90000"/>
+              </a:lnSpc>
+              <a:spcBef>
+                <a:spcPts val="500"/>
+              </a:spcBef>
+              <a:buFont typeface="Arial" panose="020B0604020202020204" pitchFamily="34" charset="0"/>
+              <a:buChar char="•"/>
+              <a:defRPr sz="1800" kern="1200">
+                <a:solidFill>
+                  <a:schemeClr val="tx1"/>
+                </a:solidFill>
+                <a:latin typeface="+mn-lt"/>
+                <a:ea typeface="+mn-ea"/>
+                <a:cs typeface="+mn-cs"/>
+              </a:defRPr>
+            </a:lvl7pPr>
+            <a:lvl8pPr marL="3429000" indent="-228600" algn="l" defTabSz="914400" rtl="0" eaLnBrk="1" latinLnBrk="0" hangingPunct="1">
+              <a:lnSpc>
+                <a:spcPct val="90000"/>
+              </a:lnSpc>
+              <a:spcBef>
+                <a:spcPts val="500"/>
+              </a:spcBef>
+              <a:buFont typeface="Arial" panose="020B0604020202020204" pitchFamily="34" charset="0"/>
+              <a:buChar char="•"/>
+              <a:defRPr sz="1800" kern="1200">
+                <a:solidFill>
+                  <a:schemeClr val="tx1"/>
+                </a:solidFill>
+                <a:latin typeface="+mn-lt"/>
+                <a:ea typeface="+mn-ea"/>
+                <a:cs typeface="+mn-cs"/>
+              </a:defRPr>
+            </a:lvl8pPr>
+            <a:lvl9pPr marL="3886200" indent="-228600" algn="l" defTabSz="914400" rtl="0" eaLnBrk="1" latinLnBrk="0" hangingPunct="1">
+              <a:lnSpc>
+                <a:spcPct val="90000"/>
+              </a:lnSpc>
+              <a:spcBef>
+                <a:spcPts val="500"/>
+              </a:spcBef>
+              <a:buFont typeface="Arial" panose="020B0604020202020204" pitchFamily="34" charset="0"/>
+              <a:buChar char="•"/>
+              <a:defRPr sz="1800" kern="1200">
+                <a:solidFill>
+                  <a:schemeClr val="tx1"/>
+                </a:solidFill>
+                <a:latin typeface="+mn-lt"/>
+                <a:ea typeface="+mn-ea"/>
+                <a:cs typeface="+mn-cs"/>
+              </a:defRPr>
+            </a:lvl9pPr>
+          </a:lstStyle>
+          <a:p>
+            <a:pPr marL="342900" indent="-342900">
+              <a:lnSpc>
+                <a:spcPct val="100000"/>
+              </a:lnSpc>
+              <a:buAutoNum type="arabicPeriod"/>
+            </a:pPr>
+            <a:endParaRPr lang="en-US" dirty="0">
+              <a:cs typeface="Calibri"/>
+            </a:endParaRPr>
+          </a:p>
+          <a:p>
+            <a:pPr>
+              <a:lnSpc>
+                <a:spcPct val="100000"/>
+              </a:lnSpc>
+            </a:pPr>
+            <a:endParaRPr lang="en-US" dirty="0">
+              <a:cs typeface="Calibri"/>
+            </a:endParaRPr>
+          </a:p>
+          <a:p>
+            <a:pPr>
+              <a:lnSpc>
+                <a:spcPct val="100000"/>
+              </a:lnSpc>
+            </a:pPr>
+            <a:endParaRPr lang="en-US" dirty="0">
+              <a:cs typeface="Calibri"/>
+            </a:endParaRPr>
+          </a:p>
+        </p:txBody>
+      </p:sp>
+      <p:pic>
+        <p:nvPicPr>
+          <p:cNvPr id="16" name="Picture 15">
+            <a:extLst>
+              <a:ext uri="{FF2B5EF4-FFF2-40B4-BE49-F238E27FC236}">
+                <a16:creationId xmlns:a16="http://schemas.microsoft.com/office/drawing/2014/main" id="{DCFF711B-BDF9-CE39-AD55-781AE335996F}"/>
+              </a:ext>
+            </a:extLst>
+          </p:cNvPr>
+          <p:cNvPicPr>
+            <a:picLocks noChangeAspect="1"/>
+          </p:cNvPicPr>
+          <p:nvPr/>
+        </p:nvPicPr>
+        <p:blipFill>
+          <a:blip r:embed="rId2"/>
+          <a:stretch>
+            <a:fillRect/>
+          </a:stretch>
+        </p:blipFill>
+        <p:spPr>
+          <a:xfrm>
+            <a:off x="1493785" y="862012"/>
+            <a:ext cx="4705350" cy="5133975"/>
+          </a:xfrm>
+          <a:prstGeom prst="rect">
+            <a:avLst/>
+          </a:prstGeom>
+        </p:spPr>
+      </p:pic>
+      <p:cxnSp>
+        <p:nvCxnSpPr>
+          <p:cNvPr id="7" name="Straight Arrow Connector 6">
+            <a:extLst>
+              <a:ext uri="{FF2B5EF4-FFF2-40B4-BE49-F238E27FC236}">
+                <a16:creationId xmlns:a16="http://schemas.microsoft.com/office/drawing/2014/main" id="{740ABB7D-E7AB-EC6C-7C58-D436720DFB6F}"/>
+              </a:ext>
+            </a:extLst>
+          </p:cNvPr>
+          <p:cNvCxnSpPr>
+            <a:cxnSpLocks/>
+          </p:cNvCxnSpPr>
+          <p:nvPr/>
+        </p:nvCxnSpPr>
+        <p:spPr>
+          <a:xfrm>
+            <a:off x="3830604" y="1839412"/>
+            <a:ext cx="0" cy="371525"/>
+          </a:xfrm>
+          <a:prstGeom prst="straightConnector1">
+            <a:avLst/>
+          </a:prstGeom>
+          <a:ln w="57150">
+            <a:solidFill>
+              <a:schemeClr val="accent3"/>
+            </a:solidFill>
+            <a:tailEnd type="triangle"/>
+          </a:ln>
+        </p:spPr>
+        <p:style>
+          <a:lnRef idx="1">
+            <a:schemeClr val="accent1"/>
+          </a:lnRef>
+          <a:fillRef idx="0">
+            <a:schemeClr val="accent1"/>
+          </a:fillRef>
+          <a:effectRef idx="0">
+            <a:schemeClr val="accent1"/>
+          </a:effectRef>
+          <a:fontRef idx="minor">
+            <a:schemeClr val="tx1"/>
+          </a:fontRef>
+        </p:style>
+      </p:cxnSp>
+      <p:cxnSp>
+        <p:nvCxnSpPr>
+          <p:cNvPr id="19" name="Straight Arrow Connector 18">
+            <a:extLst>
+              <a:ext uri="{FF2B5EF4-FFF2-40B4-BE49-F238E27FC236}">
+                <a16:creationId xmlns:a16="http://schemas.microsoft.com/office/drawing/2014/main" id="{34BD7FEF-2F43-53CD-4C2B-C65A9368E688}"/>
+              </a:ext>
+            </a:extLst>
+          </p:cNvPr>
+          <p:cNvCxnSpPr>
+            <a:cxnSpLocks/>
+          </p:cNvCxnSpPr>
+          <p:nvPr/>
+        </p:nvCxnSpPr>
+        <p:spPr>
+          <a:xfrm flipH="1">
+            <a:off x="2490716" y="2667376"/>
+            <a:ext cx="939554" cy="492081"/>
+          </a:xfrm>
+          <a:prstGeom prst="straightConnector1">
+            <a:avLst/>
+          </a:prstGeom>
+          <a:ln w="57150">
+            <a:solidFill>
+              <a:schemeClr val="accent3"/>
+            </a:solidFill>
+            <a:tailEnd type="triangle"/>
+          </a:ln>
+        </p:spPr>
+        <p:style>
+          <a:lnRef idx="1">
+            <a:schemeClr val="accent1"/>
+          </a:lnRef>
+          <a:fillRef idx="0">
+            <a:schemeClr val="accent1"/>
+          </a:fillRef>
+          <a:effectRef idx="0">
+            <a:schemeClr val="accent1"/>
+          </a:effectRef>
+          <a:fontRef idx="minor">
+            <a:schemeClr val="tx1"/>
+          </a:fontRef>
+        </p:style>
+      </p:cxnSp>
+      <p:cxnSp>
+        <p:nvCxnSpPr>
+          <p:cNvPr id="22" name="Straight Arrow Connector 21">
+            <a:extLst>
+              <a:ext uri="{FF2B5EF4-FFF2-40B4-BE49-F238E27FC236}">
+                <a16:creationId xmlns:a16="http://schemas.microsoft.com/office/drawing/2014/main" id="{B3789C92-4A0A-8A6C-D4D5-3CE7BD7C22DC}"/>
+              </a:ext>
+            </a:extLst>
+          </p:cNvPr>
+          <p:cNvCxnSpPr>
+            <a:cxnSpLocks/>
+          </p:cNvCxnSpPr>
+          <p:nvPr/>
+        </p:nvCxnSpPr>
+        <p:spPr>
+          <a:xfrm>
+            <a:off x="4251278" y="2667376"/>
+            <a:ext cx="989462" cy="492081"/>
+          </a:xfrm>
+          <a:prstGeom prst="straightConnector1">
+            <a:avLst/>
+          </a:prstGeom>
+          <a:ln w="57150">
+            <a:solidFill>
+              <a:schemeClr val="accent3"/>
+            </a:solidFill>
+            <a:tailEnd type="triangle"/>
+          </a:ln>
+        </p:spPr>
+        <p:style>
+          <a:lnRef idx="1">
+            <a:schemeClr val="accent1"/>
+          </a:lnRef>
+          <a:fillRef idx="0">
+            <a:schemeClr val="accent1"/>
+          </a:fillRef>
+          <a:effectRef idx="0">
+            <a:schemeClr val="accent1"/>
+          </a:effectRef>
+          <a:fontRef idx="minor">
+            <a:schemeClr val="tx1"/>
+          </a:fontRef>
+        </p:style>
+      </p:cxnSp>
+      <p:cxnSp>
+        <p:nvCxnSpPr>
+          <p:cNvPr id="28" name="Straight Arrow Connector 27">
+            <a:extLst>
+              <a:ext uri="{FF2B5EF4-FFF2-40B4-BE49-F238E27FC236}">
+                <a16:creationId xmlns:a16="http://schemas.microsoft.com/office/drawing/2014/main" id="{ACC29886-9612-CB78-4956-90EFEA3F6750}"/>
+              </a:ext>
+            </a:extLst>
+          </p:cNvPr>
+          <p:cNvCxnSpPr>
+            <a:cxnSpLocks/>
+          </p:cNvCxnSpPr>
+          <p:nvPr/>
+        </p:nvCxnSpPr>
+        <p:spPr>
+          <a:xfrm>
+            <a:off x="2113260" y="3766021"/>
+            <a:ext cx="0" cy="300836"/>
+          </a:xfrm>
+          <a:prstGeom prst="straightConnector1">
+            <a:avLst/>
+          </a:prstGeom>
+          <a:ln w="57150">
+            <a:solidFill>
+              <a:schemeClr val="accent3"/>
+            </a:solidFill>
+            <a:tailEnd type="triangle"/>
+          </a:ln>
+        </p:spPr>
+        <p:style>
+          <a:lnRef idx="1">
+            <a:schemeClr val="accent1"/>
+          </a:lnRef>
+          <a:fillRef idx="0">
+            <a:schemeClr val="accent1"/>
+          </a:fillRef>
+          <a:effectRef idx="0">
+            <a:schemeClr val="accent1"/>
+          </a:effectRef>
+          <a:fontRef idx="minor">
+            <a:schemeClr val="tx1"/>
+          </a:fontRef>
+        </p:style>
+      </p:cxnSp>
+      <p:cxnSp>
+        <p:nvCxnSpPr>
+          <p:cNvPr id="31" name="Straight Arrow Connector 30">
+            <a:extLst>
+              <a:ext uri="{FF2B5EF4-FFF2-40B4-BE49-F238E27FC236}">
+                <a16:creationId xmlns:a16="http://schemas.microsoft.com/office/drawing/2014/main" id="{72257F69-8DB4-2CBA-A5DC-3856ACC75947}"/>
+              </a:ext>
+            </a:extLst>
+          </p:cNvPr>
+          <p:cNvCxnSpPr>
+            <a:cxnSpLocks/>
+          </p:cNvCxnSpPr>
+          <p:nvPr/>
+        </p:nvCxnSpPr>
+        <p:spPr>
+          <a:xfrm>
+            <a:off x="2442949" y="4742597"/>
+            <a:ext cx="648269" cy="470848"/>
+          </a:xfrm>
+          <a:prstGeom prst="straightConnector1">
+            <a:avLst/>
+          </a:prstGeom>
+          <a:ln w="57150">
+            <a:solidFill>
+              <a:schemeClr val="accent3"/>
+            </a:solidFill>
+            <a:tailEnd type="triangle"/>
+          </a:ln>
+        </p:spPr>
+        <p:style>
+          <a:lnRef idx="1">
+            <a:schemeClr val="accent1"/>
+          </a:lnRef>
+          <a:fillRef idx="0">
+            <a:schemeClr val="accent1"/>
+          </a:fillRef>
+          <a:effectRef idx="0">
+            <a:schemeClr val="accent1"/>
+          </a:effectRef>
+          <a:fontRef idx="minor">
+            <a:schemeClr val="tx1"/>
+          </a:fontRef>
+        </p:style>
+      </p:cxnSp>
+      <p:cxnSp>
+        <p:nvCxnSpPr>
+          <p:cNvPr id="34" name="Straight Arrow Connector 33">
+            <a:extLst>
+              <a:ext uri="{FF2B5EF4-FFF2-40B4-BE49-F238E27FC236}">
+                <a16:creationId xmlns:a16="http://schemas.microsoft.com/office/drawing/2014/main" id="{E3744586-6A5E-55DE-8C00-D0903A7F72E9}"/>
+              </a:ext>
+            </a:extLst>
+          </p:cNvPr>
+          <p:cNvCxnSpPr>
+            <a:cxnSpLocks/>
+          </p:cNvCxnSpPr>
+          <p:nvPr/>
+        </p:nvCxnSpPr>
+        <p:spPr>
+          <a:xfrm flipH="1">
+            <a:off x="4531057" y="3766021"/>
+            <a:ext cx="777922" cy="1297298"/>
+          </a:xfrm>
+          <a:prstGeom prst="straightConnector1">
+            <a:avLst/>
+          </a:prstGeom>
+          <a:ln w="57150">
+            <a:solidFill>
+              <a:schemeClr val="accent3"/>
+            </a:solidFill>
+            <a:tailEnd type="triangle"/>
+          </a:ln>
+        </p:spPr>
+        <p:style>
+          <a:lnRef idx="1">
+            <a:schemeClr val="accent1"/>
+          </a:lnRef>
+          <a:fillRef idx="0">
+            <a:schemeClr val="accent1"/>
+          </a:fillRef>
+          <a:effectRef idx="0">
+            <a:schemeClr val="accent1"/>
+          </a:effectRef>
+          <a:fontRef idx="minor">
+            <a:schemeClr val="tx1"/>
+          </a:fontRef>
+        </p:style>
+      </p:cxnSp>
+      <p:sp>
+        <p:nvSpPr>
+          <p:cNvPr id="42" name="Rectangle 41">
+            <a:extLst>
+              <a:ext uri="{FF2B5EF4-FFF2-40B4-BE49-F238E27FC236}">
+                <a16:creationId xmlns:a16="http://schemas.microsoft.com/office/drawing/2014/main" id="{F57371B4-F94A-30B4-10B2-792F0C3081DF}"/>
+              </a:ext>
+            </a:extLst>
+          </p:cNvPr>
+          <p:cNvSpPr/>
+          <p:nvPr/>
+        </p:nvSpPr>
+        <p:spPr>
+          <a:xfrm>
+            <a:off x="2825087" y="4978021"/>
+            <a:ext cx="2081283" cy="870045"/>
+          </a:xfrm>
+          <a:prstGeom prst="rect">
+            <a:avLst/>
+          </a:prstGeom>
+          <a:solidFill>
+            <a:schemeClr val="accent1">
+              <a:alpha val="4000"/>
+            </a:schemeClr>
+          </a:solidFill>
+        </p:spPr>
+        <p:style>
+          <a:lnRef idx="2">
+            <a:schemeClr val="accent1">
+              <a:shade val="50000"/>
+            </a:schemeClr>
+          </a:lnRef>
+          <a:fillRef idx="1">
+            <a:schemeClr val="accent1"/>
+          </a:fillRef>
+          <a:effectRef idx="0">
+            <a:schemeClr val="accent1"/>
+          </a:effectRef>
+          <a:fontRef idx="minor">
+            <a:schemeClr val="lt1"/>
+          </a:fontRef>
+        </p:style>
+        <p:txBody>
+          <a:bodyPr rtlCol="0" anchor="ctr"/>
+          <a:lstStyle/>
+          <a:p>
+            <a:pPr algn="ctr"/>
+            <a:endParaRPr lang="en-KE"/>
+          </a:p>
+        </p:txBody>
+      </p:sp>
+    </p:spTree>
+    <p:extLst>
+      <p:ext uri="{BB962C8B-B14F-4D97-AF65-F5344CB8AC3E}">
+        <p14:creationId xmlns:p14="http://schemas.microsoft.com/office/powerpoint/2010/main" val="3797082"/>
+      </p:ext>
+    </p:extLst>
+  </p:cSld>
+  <p:clrMapOvr>
+    <a:masterClrMapping/>
+  </p:clrMapOvr>
+</p:sld>
+</file>
+
+<file path=ppt/slides/slide2.xml><?xml version="1.0" encoding="utf-8"?>
+<p:sld xmlns:a="http://schemas.openxmlformats.org/drawingml/2006/main" xmlns:r="http://schemas.openxmlformats.org/officeDocument/2006/relationships" xmlns:p="http://schemas.openxmlformats.org/presentationml/2006/main">
+  <p:cSld>
+    <p:spTree>
+      <p:nvGrpSpPr>
+        <p:cNvPr id="1" name=""/>
+        <p:cNvGrpSpPr/>
+        <p:nvPr/>
+      </p:nvGrpSpPr>
+      <p:grpSpPr>
+        <a:xfrm>
+          <a:off x="0" y="0"/>
+          <a:ext cx="0" cy="0"/>
+          <a:chOff x="0" y="0"/>
+          <a:chExt cx="0" cy="0"/>
+        </a:xfrm>
+      </p:grpSpPr>
+      <p:sp>
+        <p:nvSpPr>
+          <p:cNvPr id="2" name="Title 1">
+            <a:extLst>
+              <a:ext uri="{FF2B5EF4-FFF2-40B4-BE49-F238E27FC236}">
+                <a16:creationId xmlns:a16="http://schemas.microsoft.com/office/drawing/2014/main" id="{BE3A87B3-0A27-4EE9-979E-B69581E476F0}"/>
+              </a:ext>
+            </a:extLst>
+          </p:cNvPr>
+          <p:cNvSpPr>
+            <a:spLocks noGrp="1"/>
+          </p:cNvSpPr>
+          <p:nvPr>
+            <p:ph type="title"/>
+          </p:nvPr>
+        </p:nvSpPr>
+        <p:spPr/>
+        <p:txBody>
+          <a:bodyPr/>
+          <a:lstStyle/>
+          <a:p>
+            <a:r>
+              <a:rPr lang="en-US" dirty="0"/>
+              <a:t>Agenda</a:t>
+            </a:r>
+          </a:p>
+        </p:txBody>
+      </p:sp>
+      <p:pic>
+        <p:nvPicPr>
+          <p:cNvPr id="8" name="Picture Placeholder 7" descr="group of people at a conference table">
+            <a:extLst>
+              <a:ext uri="{FF2B5EF4-FFF2-40B4-BE49-F238E27FC236}">
+                <a16:creationId xmlns:a16="http://schemas.microsoft.com/office/drawing/2014/main" id="{BB76F5AB-0940-46E1-85F9-6A870D7D04C9}"/>
+              </a:ext>
+            </a:extLst>
+          </p:cNvPr>
+          <p:cNvPicPr>
+            <a:picLocks noGrp="1" noChangeAspect="1"/>
+          </p:cNvPicPr>
+          <p:nvPr>
+            <p:ph type="pic" sz="quarter" idx="13"/>
+          </p:nvPr>
+        </p:nvPicPr>
+        <p:blipFill rotWithShape="1">
+          <a:blip r:embed="rId2">
+            <a:extLst>
+              <a:ext uri="{BEBA8EAE-BF5A-486C-A8C5-ECC9F3942E4B}">
+                <a14:imgProps xmlns:a14="http://schemas.microsoft.com/office/drawing/2010/main">
+                  <a14:imgLayer r:embed="rId3">
+                    <a14:imgEffect>
+                      <a14:saturation sat="0"/>
+                    </a14:imgEffect>
+                  </a14:imgLayer>
+                </a14:imgProps>
+              </a:ext>
+            </a:extLst>
+          </a:blip>
+          <a:srcRect l="20370" r="20370"/>
+          <a:stretch/>
+        </p:blipFill>
+        <p:spPr/>
+      </p:pic>
+      <p:sp>
+        <p:nvSpPr>
+          <p:cNvPr id="6" name="Text Placeholder 5">
+            <a:extLst>
+              <a:ext uri="{FF2B5EF4-FFF2-40B4-BE49-F238E27FC236}">
+                <a16:creationId xmlns:a16="http://schemas.microsoft.com/office/drawing/2014/main" id="{F3C89A40-EEAA-43AB-9A3A-B2CFDE450F1B}"/>
+              </a:ext>
+            </a:extLst>
+          </p:cNvPr>
+          <p:cNvSpPr>
+            <a:spLocks noGrp="1"/>
+          </p:cNvSpPr>
+          <p:nvPr>
+            <p:ph type="body" sz="quarter" idx="15"/>
+          </p:nvPr>
+        </p:nvSpPr>
+        <p:spPr/>
+        <p:txBody>
+          <a:bodyPr vert="horz" lIns="91440" tIns="45720" rIns="91440" bIns="45720" rtlCol="0" anchor="t">
+            <a:noAutofit/>
+          </a:bodyPr>
+          <a:lstStyle/>
+          <a:p>
+            <a:r>
+              <a:rPr lang="en-US" dirty="0"/>
+              <a:t>INTRODUCTION</a:t>
+            </a:r>
+          </a:p>
+          <a:p>
+            <a:r>
+              <a:rPr lang="en-US" dirty="0">
+                <a:cs typeface="Calibri"/>
+              </a:rPr>
+              <a:t>ROADMAP</a:t>
+            </a:r>
+          </a:p>
+          <a:p>
+            <a:r>
+              <a:rPr lang="en-US" dirty="0"/>
+              <a:t>THE YELP DATASET</a:t>
+            </a:r>
+            <a:endParaRPr lang="en-US" dirty="0">
+              <a:cs typeface="Calibri"/>
+            </a:endParaRPr>
+          </a:p>
+          <a:p>
+            <a:r>
+              <a:rPr lang="en-US" dirty="0">
+                <a:cs typeface="Calibri"/>
+              </a:rPr>
+              <a:t>EXPLORATION</a:t>
+            </a:r>
+            <a:endParaRPr lang="en-US" dirty="0"/>
+          </a:p>
+          <a:p>
+            <a:r>
+              <a:rPr lang="en-US" dirty="0">
+                <a:cs typeface="Calibri"/>
+              </a:rPr>
+              <a:t>METHODS FOR AUGMENTATION</a:t>
+            </a:r>
+          </a:p>
+          <a:p>
+            <a:r>
+              <a:rPr lang="en-US" dirty="0">
+                <a:cs typeface="Calibri"/>
+              </a:rPr>
+              <a:t>WHAT’S NEXT</a:t>
+            </a:r>
+          </a:p>
+          <a:p>
+            <a:endParaRPr lang="en-US" dirty="0">
+              <a:cs typeface="Calibri"/>
+            </a:endParaRPr>
+          </a:p>
+        </p:txBody>
+      </p:sp>
+      <p:sp>
+        <p:nvSpPr>
+          <p:cNvPr id="7" name="Slide Number Placeholder 6">
+            <a:extLst>
+              <a:ext uri="{FF2B5EF4-FFF2-40B4-BE49-F238E27FC236}">
+                <a16:creationId xmlns:a16="http://schemas.microsoft.com/office/drawing/2014/main" id="{F29F8048-1E86-48F4-B246-D2F8C54B7EB1}"/>
+              </a:ext>
+            </a:extLst>
+          </p:cNvPr>
+          <p:cNvSpPr>
+            <a:spLocks noGrp="1"/>
+          </p:cNvSpPr>
+          <p:nvPr>
+            <p:ph type="sldNum" sz="quarter" idx="12"/>
+          </p:nvPr>
+        </p:nvSpPr>
+        <p:spPr/>
+        <p:txBody>
+          <a:bodyPr/>
+          <a:lstStyle/>
+          <a:p>
+            <a:fld id="{8C2E478F-E849-4A8C-AF1F-CBCC78A7CBFA}" type="slidenum">
+              <a:rPr lang="en-US" smtClean="0"/>
+              <a:pPr/>
+              <a:t>2</a:t>
+            </a:fld>
+            <a:endParaRPr lang="en-US"/>
+          </a:p>
+        </p:txBody>
+      </p:sp>
+    </p:spTree>
+    <p:extLst>
+      <p:ext uri="{BB962C8B-B14F-4D97-AF65-F5344CB8AC3E}">
+        <p14:creationId xmlns:p14="http://schemas.microsoft.com/office/powerpoint/2010/main" val="1649098948"/>
+      </p:ext>
+    </p:extLst>
+  </p:cSld>
+  <p:clrMapOvr>
+    <a:masterClrMapping/>
+  </p:clrMapOvr>
+</p:sld>
+</file>
+
+<file path=ppt/slides/slide20.xml><?xml version="1.0" encoding="utf-8"?>
+<p:sld xmlns:a="http://schemas.openxmlformats.org/drawingml/2006/main" xmlns:r="http://schemas.openxmlformats.org/officeDocument/2006/relationships" xmlns:p="http://schemas.openxmlformats.org/presentationml/2006/main">
+  <p:cSld>
+    <p:spTree>
+      <p:nvGrpSpPr>
+        <p:cNvPr id="1" name=""/>
+        <p:cNvGrpSpPr/>
+        <p:nvPr/>
+      </p:nvGrpSpPr>
+      <p:grpSpPr>
+        <a:xfrm>
+          <a:off x="0" y="0"/>
+          <a:ext cx="0" cy="0"/>
+          <a:chOff x="0" y="0"/>
+          <a:chExt cx="0" cy="0"/>
+        </a:xfrm>
+      </p:grpSpPr>
+      <p:sp>
+        <p:nvSpPr>
           <p:cNvPr id="3" name="Slide Number Placeholder 2">
             <a:extLst>
               <a:ext uri="{FF2B5EF4-FFF2-40B4-BE49-F238E27FC236}">
@@ -11643,7 +12472,7 @@
           <a:p>
             <a:fld id="{8C2E478F-E849-4A8C-AF1F-CBCC78A7CBFA}" type="slidenum">
               <a:rPr lang="en-US" smtClean="0"/>
-              <a:t>19</a:t>
+              <a:t>20</a:t>
             </a:fld>
             <a:endParaRPr lang="en-US"/>
           </a:p>
@@ -11736,207 +12565,7 @@
 </p:sld>
 </file>
 
-<file path=ppt/slides/slide2.xml><?xml version="1.0" encoding="utf-8"?>
-<p:sld xmlns:a="http://schemas.openxmlformats.org/drawingml/2006/main" xmlns:r="http://schemas.openxmlformats.org/officeDocument/2006/relationships" xmlns:p="http://schemas.openxmlformats.org/presentationml/2006/main">
-  <p:cSld>
-    <p:spTree>
-      <p:nvGrpSpPr>
-        <p:cNvPr id="1" name=""/>
-        <p:cNvGrpSpPr/>
-        <p:nvPr/>
-      </p:nvGrpSpPr>
-      <p:grpSpPr>
-        <a:xfrm>
-          <a:off x="0" y="0"/>
-          <a:ext cx="0" cy="0"/>
-          <a:chOff x="0" y="0"/>
-          <a:chExt cx="0" cy="0"/>
-        </a:xfrm>
-      </p:grpSpPr>
-      <p:sp>
-        <p:nvSpPr>
-          <p:cNvPr id="2" name="Title 1">
-            <a:extLst>
-              <a:ext uri="{FF2B5EF4-FFF2-40B4-BE49-F238E27FC236}">
-                <a16:creationId xmlns:a16="http://schemas.microsoft.com/office/drawing/2014/main" id="{BE3A87B3-0A27-4EE9-979E-B69581E476F0}"/>
-              </a:ext>
-            </a:extLst>
-          </p:cNvPr>
-          <p:cNvSpPr>
-            <a:spLocks noGrp="1"/>
-          </p:cNvSpPr>
-          <p:nvPr>
-            <p:ph type="title"/>
-          </p:nvPr>
-        </p:nvSpPr>
-        <p:spPr/>
-        <p:txBody>
-          <a:bodyPr/>
-          <a:lstStyle/>
-          <a:p>
-            <a:r>
-              <a:rPr lang="en-US" dirty="0"/>
-              <a:t>Agenda</a:t>
-            </a:r>
-          </a:p>
-        </p:txBody>
-      </p:sp>
-      <p:pic>
-        <p:nvPicPr>
-          <p:cNvPr id="8" name="Picture Placeholder 7" descr="group of people at a conference table">
-            <a:extLst>
-              <a:ext uri="{FF2B5EF4-FFF2-40B4-BE49-F238E27FC236}">
-                <a16:creationId xmlns:a16="http://schemas.microsoft.com/office/drawing/2014/main" id="{BB76F5AB-0940-46E1-85F9-6A870D7D04C9}"/>
-              </a:ext>
-            </a:extLst>
-          </p:cNvPr>
-          <p:cNvPicPr>
-            <a:picLocks noGrp="1" noChangeAspect="1"/>
-          </p:cNvPicPr>
-          <p:nvPr>
-            <p:ph type="pic" sz="quarter" idx="13"/>
-          </p:nvPr>
-        </p:nvPicPr>
-        <p:blipFill rotWithShape="1">
-          <a:blip r:embed="rId2">
-            <a:extLst>
-              <a:ext uri="{BEBA8EAE-BF5A-486C-A8C5-ECC9F3942E4B}">
-                <a14:imgProps xmlns:a14="http://schemas.microsoft.com/office/drawing/2010/main">
-                  <a14:imgLayer r:embed="rId3">
-                    <a14:imgEffect>
-                      <a14:saturation sat="0"/>
-                    </a14:imgEffect>
-                  </a14:imgLayer>
-                </a14:imgProps>
-              </a:ext>
-            </a:extLst>
-          </a:blip>
-          <a:srcRect l="20370" r="20370"/>
-          <a:stretch/>
-        </p:blipFill>
-        <p:spPr/>
-      </p:pic>
-      <p:sp>
-        <p:nvSpPr>
-          <p:cNvPr id="6" name="Text Placeholder 5">
-            <a:extLst>
-              <a:ext uri="{FF2B5EF4-FFF2-40B4-BE49-F238E27FC236}">
-                <a16:creationId xmlns:a16="http://schemas.microsoft.com/office/drawing/2014/main" id="{F3C89A40-EEAA-43AB-9A3A-B2CFDE450F1B}"/>
-              </a:ext>
-            </a:extLst>
-          </p:cNvPr>
-          <p:cNvSpPr>
-            <a:spLocks noGrp="1"/>
-          </p:cNvSpPr>
-          <p:nvPr>
-            <p:ph type="body" sz="quarter" idx="15"/>
-          </p:nvPr>
-        </p:nvSpPr>
-        <p:spPr/>
-        <p:txBody>
-          <a:bodyPr vert="horz" lIns="91440" tIns="45720" rIns="91440" bIns="45720" rtlCol="0" anchor="t">
-            <a:noAutofit/>
-          </a:bodyPr>
-          <a:lstStyle/>
-          <a:p>
-            <a:r>
-              <a:rPr lang="en-US" dirty="0"/>
-              <a:t>INTRODUCTION</a:t>
-            </a:r>
-          </a:p>
-          <a:p>
-            <a:r>
-              <a:rPr lang="en-US" dirty="0">
-                <a:cs typeface="Calibri"/>
-              </a:rPr>
-              <a:t>ROADMAP</a:t>
-            </a:r>
-          </a:p>
-          <a:p>
-            <a:r>
-              <a:rPr lang="en-US" dirty="0"/>
-              <a:t>THE YELP DATASET</a:t>
-            </a:r>
-            <a:endParaRPr lang="en-US" dirty="0">
-              <a:cs typeface="Calibri"/>
-            </a:endParaRPr>
-          </a:p>
-          <a:p>
-            <a:r>
-              <a:rPr lang="en-US" dirty="0">
-                <a:cs typeface="Calibri"/>
-              </a:rPr>
-              <a:t>EXPLORATION</a:t>
-            </a:r>
-            <a:endParaRPr lang="en-US" dirty="0"/>
-          </a:p>
-          <a:p>
-            <a:r>
-              <a:rPr lang="en-US" dirty="0">
-                <a:cs typeface="Calibri"/>
-              </a:rPr>
-              <a:t>METHODS FOR AUGMENTATION</a:t>
-            </a:r>
-          </a:p>
-          <a:p>
-            <a:r>
-              <a:rPr lang="en-US" dirty="0">
-                <a:cs typeface="Calibri"/>
-              </a:rPr>
-              <a:t>WHAT’S NEXT</a:t>
-            </a:r>
-          </a:p>
-          <a:p>
-            <a:endParaRPr lang="en-US" dirty="0">
-              <a:cs typeface="Calibri"/>
-            </a:endParaRPr>
-          </a:p>
-        </p:txBody>
-      </p:sp>
-      <p:sp>
-        <p:nvSpPr>
-          <p:cNvPr id="7" name="Slide Number Placeholder 6">
-            <a:extLst>
-              <a:ext uri="{FF2B5EF4-FFF2-40B4-BE49-F238E27FC236}">
-                <a16:creationId xmlns:a16="http://schemas.microsoft.com/office/drawing/2014/main" id="{F29F8048-1E86-48F4-B246-D2F8C54B7EB1}"/>
-              </a:ext>
-            </a:extLst>
-          </p:cNvPr>
-          <p:cNvSpPr>
-            <a:spLocks noGrp="1"/>
-          </p:cNvSpPr>
-          <p:nvPr>
-            <p:ph type="sldNum" sz="quarter" idx="12"/>
-          </p:nvPr>
-        </p:nvSpPr>
-        <p:spPr/>
-        <p:txBody>
-          <a:bodyPr/>
-          <a:lstStyle/>
-          <a:p>
-            <a:fld id="{8C2E478F-E849-4A8C-AF1F-CBCC78A7CBFA}" type="slidenum">
-              <a:rPr lang="en-US" smtClean="0"/>
-              <a:pPr/>
-              <a:t>2</a:t>
-            </a:fld>
-            <a:endParaRPr lang="en-US"/>
-          </a:p>
-        </p:txBody>
-      </p:sp>
-    </p:spTree>
-    <p:extLst>
-      <p:ext uri="{BB962C8B-B14F-4D97-AF65-F5344CB8AC3E}">
-        <p14:creationId xmlns:p14="http://schemas.microsoft.com/office/powerpoint/2010/main" val="1649098948"/>
-      </p:ext>
-    </p:extLst>
-  </p:cSld>
-  <p:clrMapOvr>
-    <a:masterClrMapping/>
-  </p:clrMapOvr>
-</p:sld>
-</file>
-
-<file path=ppt/slides/slide20.xml><?xml version="1.0" encoding="utf-8"?>
+<file path=ppt/slides/slide21.xml><?xml version="1.0" encoding="utf-8"?>
 <p:sld xmlns:a="http://schemas.openxmlformats.org/drawingml/2006/main" xmlns:r="http://schemas.openxmlformats.org/officeDocument/2006/relationships" xmlns:p="http://schemas.openxmlformats.org/presentationml/2006/main">
   <p:cSld>
     <p:spTree>
@@ -11976,7 +12605,7 @@
           <a:p>
             <a:fld id="{8C2E478F-E849-4A8C-AF1F-CBCC78A7CBFA}" type="slidenum">
               <a:rPr lang="en-US" smtClean="0"/>
-              <a:t>20</a:t>
+              <a:t>21</a:t>
             </a:fld>
             <a:endParaRPr lang="en-US"/>
           </a:p>
@@ -12252,7 +12881,7 @@
 </p:sld>
 </file>
 
-<file path=ppt/slides/slide21.xml><?xml version="1.0" encoding="utf-8"?>
+<file path=ppt/slides/slide22.xml><?xml version="1.0" encoding="utf-8"?>
 <p:sld xmlns:a="http://schemas.openxmlformats.org/drawingml/2006/main" xmlns:r="http://schemas.openxmlformats.org/officeDocument/2006/relationships" xmlns:p="http://schemas.openxmlformats.org/presentationml/2006/main">
   <p:cSld>
     <p:spTree>
@@ -12292,7 +12921,7 @@
           <a:p>
             <a:fld id="{8C2E478F-E849-4A8C-AF1F-CBCC78A7CBFA}" type="slidenum">
               <a:rPr lang="en-US" smtClean="0"/>
-              <a:t>21</a:t>
+              <a:t>22</a:t>
             </a:fld>
             <a:endParaRPr lang="en-US"/>
           </a:p>
@@ -12631,7 +13260,7 @@
 </p:sld>
 </file>
 
-<file path=ppt/slides/slide22.xml><?xml version="1.0" encoding="utf-8"?>
+<file path=ppt/slides/slide23.xml><?xml version="1.0" encoding="utf-8"?>
 <p:sld xmlns:a="http://schemas.openxmlformats.org/drawingml/2006/main" xmlns:r="http://schemas.openxmlformats.org/officeDocument/2006/relationships" xmlns:p="http://schemas.openxmlformats.org/presentationml/2006/main">
   <p:cSld>
     <p:bg>
@@ -17641,15 +18270,6 @@
 </file>
 
 <file path=customXml/item1.xml><?xml version="1.0" encoding="utf-8"?>
-<?mso-contentType ?>
-<FormTemplates xmlns="http://schemas.microsoft.com/sharepoint/v3/contenttype/forms">
-  <Display>DocumentLibraryForm</Display>
-  <Edit>DocumentLibraryForm</Edit>
-  <New>DocumentLibraryForm</New>
-</FormTemplates>
-</file>
-
-<file path=customXml/item2.xml><?xml version="1.0" encoding="utf-8"?>
 <ct:contentTypeSchema xmlns:ct="http://schemas.microsoft.com/office/2006/metadata/contentType" xmlns:ma="http://schemas.microsoft.com/office/2006/metadata/properties/metaAttributes" ct:_="" ma:_="" ma:contentTypeName="Document" ma:contentTypeID="0x01010079F111ED35F8CC479449609E8A0923A6" ma:contentTypeVersion="12" ma:contentTypeDescription="Create a new document." ma:contentTypeScope="" ma:versionID="426e97fa315356fffbdcd9876fe988c2">
   <xsd:schema xmlns:xsd="http://www.w3.org/2001/XMLSchema" xmlns:xs="http://www.w3.org/2001/XMLSchema" xmlns:p="http://schemas.microsoft.com/office/2006/metadata/properties" xmlns:ns2="71af3243-3dd4-4a8d-8c0d-dd76da1f02a5" xmlns:ns3="16c05727-aa75-4e4a-9b5f-8a80a1165891" targetNamespace="http://schemas.microsoft.com/office/2006/metadata/properties" ma:root="true" ma:fieldsID="14b8f0def80e6d70ce3def20c90759ae" ns2:_="" ns3:_="">
     <xsd:import namespace="71af3243-3dd4-4a8d-8c0d-dd76da1f02a5"/>
@@ -17870,6 +18490,15 @@
 </ct:contentTypeSchema>
 </file>
 
+<file path=customXml/item2.xml><?xml version="1.0" encoding="utf-8"?>
+<?mso-contentType ?>
+<FormTemplates xmlns="http://schemas.microsoft.com/sharepoint/v3/contenttype/forms">
+  <Display>DocumentLibraryForm</Display>
+  <Edit>DocumentLibraryForm</Edit>
+  <New>DocumentLibraryForm</New>
+</FormTemplates>
+</file>
+
 <file path=customXml/item3.xml><?xml version="1.0" encoding="utf-8"?>
 <p:properties xmlns:p="http://schemas.microsoft.com/office/2006/metadata/properties" xmlns:xsi="http://www.w3.org/2001/XMLSchema-instance" xmlns:pc="http://schemas.microsoft.com/office/infopath/2007/PartnerControls">
   <documentManagement>
@@ -17880,14 +18509,6 @@
 </file>
 
 <file path=customXml/itemProps1.xml><?xml version="1.0" encoding="utf-8"?>
-<ds:datastoreItem xmlns:ds="http://schemas.openxmlformats.org/officeDocument/2006/customXml" ds:itemID="{99E4EAC9-33DC-4CF0-BA31-C98F61CE4785}">
-  <ds:schemaRefs>
-    <ds:schemaRef ds:uri="http://schemas.microsoft.com/sharepoint/v3/contenttype/forms"/>
-  </ds:schemaRefs>
-</ds:datastoreItem>
-</file>
-
-<file path=customXml/itemProps2.xml><?xml version="1.0" encoding="utf-8"?>
 <ds:datastoreItem xmlns:ds="http://schemas.openxmlformats.org/officeDocument/2006/customXml" ds:itemID="{99A06775-4FD5-4278-BDCC-E6FF131E966F}">
   <ds:schemaRefs>
     <ds:schemaRef ds:uri="16c05727-aa75-4e4a-9b5f-8a80a1165891"/>
@@ -17906,6 +18527,14 @@
 </ds:datastoreItem>
 </file>
 
+<file path=customXml/itemProps2.xml><?xml version="1.0" encoding="utf-8"?>
+<ds:datastoreItem xmlns:ds="http://schemas.openxmlformats.org/officeDocument/2006/customXml" ds:itemID="{99E4EAC9-33DC-4CF0-BA31-C98F61CE4785}">
+  <ds:schemaRefs>
+    <ds:schemaRef ds:uri="http://schemas.microsoft.com/sharepoint/v3/contenttype/forms"/>
+  </ds:schemaRefs>
+</ds:datastoreItem>
+</file>
+
 <file path=customXml/itemProps3.xml><?xml version="1.0" encoding="utf-8"?>
 <ds:datastoreItem xmlns:ds="http://schemas.openxmlformats.org/officeDocument/2006/customXml" ds:itemID="{8002A8ED-1331-4C1D-8649-743D7BE164DD}">
   <ds:schemaRefs>

</xml_diff>